<commit_message>
New version of the poster
</commit_message>
<xml_diff>
--- a/Poster/Poster_nieuw.pptx
+++ b/Poster/Poster_nieuw.pptx
@@ -968,17 +968,25 @@
       </dgm:t>
     </dgm:pt>
     <dgm:pt modelId="{4BA5B9B9-D4B3-1D4C-A08A-FC44E422CFDB}">
-      <dgm:prSet phldrT="[Tekst]"/>
+      <dgm:prSet phldrT="[Tekst]" custT="1"/>
       <dgm:spPr/>
       <dgm:t>
         <a:bodyPr/>
         <a:lstStyle/>
         <a:p>
           <a:r>
-            <a:rPr lang="nl-NL" dirty="0" smtClean="0"/>
+            <a:rPr lang="nl-NL" sz="4800" dirty="0" smtClean="0">
+              <a:latin typeface="Avenir Next" charset="0"/>
+              <a:ea typeface="Avenir Next" charset="0"/>
+              <a:cs typeface="Avenir Next" charset="0"/>
+            </a:rPr>
             <a:t>N</a:t>
           </a:r>
-          <a:endParaRPr lang="nl-NL" dirty="0"/>
+          <a:endParaRPr lang="nl-NL" sz="4800" dirty="0">
+            <a:latin typeface="Avenir Next" charset="0"/>
+            <a:ea typeface="Avenir Next" charset="0"/>
+            <a:cs typeface="Avenir Next" charset="0"/>
+          </a:endParaRPr>
         </a:p>
       </dgm:t>
     </dgm:pt>
@@ -995,7 +1003,11 @@
     </dgm:pt>
     <dgm:pt modelId="{242F5323-24B4-2D4E-915B-4803422B58EC}" type="sibTrans" cxnId="{F2F00010-8B0B-A943-AB70-2A048F9BABBA}">
       <dgm:prSet/>
-      <dgm:spPr/>
+      <dgm:spPr>
+        <a:solidFill>
+          <a:srgbClr val="256BA1"/>
+        </a:solidFill>
+      </dgm:spPr>
       <dgm:t>
         <a:bodyPr/>
         <a:lstStyle/>
@@ -1005,17 +1017,25 @@
       </dgm:t>
     </dgm:pt>
     <dgm:pt modelId="{A9A8773B-48A9-E441-8E3A-A30D2A514B65}">
-      <dgm:prSet phldrT="[Tekst]"/>
+      <dgm:prSet phldrT="[Tekst]" custT="1"/>
       <dgm:spPr/>
       <dgm:t>
         <a:bodyPr/>
         <a:lstStyle/>
         <a:p>
           <a:r>
-            <a:rPr lang="nl-NL" dirty="0" smtClean="0"/>
+            <a:rPr lang="nl-NL" sz="4800" dirty="0" smtClean="0">
+              <a:latin typeface="Avenir Next" charset="0"/>
+              <a:ea typeface="Avenir Next" charset="0"/>
+              <a:cs typeface="Avenir Next" charset="0"/>
+            </a:rPr>
             <a:t>R</a:t>
           </a:r>
-          <a:endParaRPr lang="nl-NL" dirty="0"/>
+          <a:endParaRPr lang="nl-NL" sz="4800" dirty="0">
+            <a:latin typeface="Avenir Next" charset="0"/>
+            <a:ea typeface="Avenir Next" charset="0"/>
+            <a:cs typeface="Avenir Next" charset="0"/>
+          </a:endParaRPr>
         </a:p>
       </dgm:t>
     </dgm:pt>
@@ -1033,6 +1053,9 @@
     <dgm:pt modelId="{D970EA3B-F985-D74F-8758-0B05E31B786D}" type="sibTrans" cxnId="{46E67A6D-1BF9-9547-9B0A-944B87C45C2B}">
       <dgm:prSet/>
       <dgm:spPr>
+        <a:solidFill>
+          <a:srgbClr val="256BA1"/>
+        </a:solidFill>
         <a:effectLst>
           <a:outerShdw blurRad="40000" dir="5400000" rotWithShape="0">
             <a:srgbClr val="000000">
@@ -1070,7 +1093,7 @@
       <dgm:spPr/>
     </dgm:pt>
     <dgm:pt modelId="{DB3E0501-CC1F-F345-A426-DE9532CD387E}" type="pres">
-      <dgm:prSet presAssocID="{4BA5B9B9-D4B3-1D4C-A08A-FC44E422CFDB}" presName="node" presStyleLbl="revTx" presStyleIdx="0" presStyleCnt="2" custScaleX="21345" custScaleY="21187">
+      <dgm:prSet presAssocID="{4BA5B9B9-D4B3-1D4C-A08A-FC44E422CFDB}" presName="node" presStyleLbl="revTx" presStyleIdx="0" presStyleCnt="2" custScaleX="21345" custScaleY="38402">
         <dgm:presLayoutVars>
           <dgm:bulletEnabled val="1"/>
         </dgm:presLayoutVars>
@@ -1100,7 +1123,7 @@
       <dgm:spPr/>
     </dgm:pt>
     <dgm:pt modelId="{162C1480-8610-0246-99C5-1C606DB83CEE}" type="pres">
-      <dgm:prSet presAssocID="{A9A8773B-48A9-E441-8E3A-A30D2A514B65}" presName="node" presStyleLbl="revTx" presStyleIdx="1" presStyleCnt="2" custScaleX="27791" custScaleY="17193">
+      <dgm:prSet presAssocID="{A9A8773B-48A9-E441-8E3A-A30D2A514B65}" presName="node" presStyleLbl="revTx" presStyleIdx="1" presStyleCnt="2" custScaleX="27791" custScaleY="38403" custRadScaleRad="98594">
         <dgm:presLayoutVars>
           <dgm:bulletEnabled val="1"/>
         </dgm:presLayoutVars>
@@ -1141,11 +1164,13 @@
     <dgm:cxn modelId="{CFCD92B6-BEDF-2140-8DE8-D30880453A67}" type="presParOf" srcId="{180F8959-E184-A345-8F18-A7908437FE87}" destId="{162C1480-8610-0246-99C5-1C606DB83CEE}" srcOrd="4" destOrd="0" presId="urn:microsoft.com/office/officeart/2005/8/layout/cycle1"/>
     <dgm:cxn modelId="{EB7AB2E2-BB20-AF43-BEB9-A0FBFD4EF013}" type="presParOf" srcId="{180F8959-E184-A345-8F18-A7908437FE87}" destId="{82A1DAD5-D719-C24A-A140-7F7493E5FA5C}" srcOrd="5" destOrd="0" presId="urn:microsoft.com/office/officeart/2005/8/layout/cycle1"/>
   </dgm:cxnLst>
-  <dgm:bg/>
+  <dgm:bg>
+    <a:noFill/>
+  </dgm:bg>
   <dgm:whole/>
   <dgm:extLst>
     <a:ext uri="http://schemas.microsoft.com/office/drawing/2008/diagram">
-      <dsp:dataModelExt xmlns:dsp="http://schemas.microsoft.com/office/drawing/2008/diagram" relId="rId12" minVer="http://schemas.openxmlformats.org/drawingml/2006/diagram"/>
+      <dsp:dataModelExt xmlns:dsp="http://schemas.microsoft.com/office/drawing/2008/diagram" relId="rId9" minVer="http://schemas.openxmlformats.org/drawingml/2006/diagram"/>
     </a:ext>
   </dgm:extLst>
 </dgm:dataModel>
@@ -1166,8 +1191,8 @@
       </dsp:nvSpPr>
       <dsp:spPr>
         <a:xfrm>
-          <a:off x="6562351" y="3443355"/>
-          <a:ext cx="630330" cy="625664"/>
+          <a:off x="6562351" y="3189170"/>
+          <a:ext cx="630330" cy="1134034"/>
         </a:xfrm>
         <a:prstGeom prst="rect">
           <a:avLst/>
@@ -1191,12 +1216,12 @@
         <a:fontRef idx="minor"/>
       </dsp:style>
       <dsp:txBody>
-        <a:bodyPr spcFirstLastPara="0" vert="horz" wrap="square" lIns="40640" tIns="40640" rIns="40640" bIns="40640" numCol="1" spcCol="1270" anchor="ctr" anchorCtr="0">
+        <a:bodyPr spcFirstLastPara="0" vert="horz" wrap="square" lIns="60960" tIns="60960" rIns="60960" bIns="60960" numCol="1" spcCol="1270" anchor="ctr" anchorCtr="0">
           <a:noAutofit/>
         </a:bodyPr>
         <a:lstStyle/>
         <a:p>
-          <a:pPr lvl="0" algn="ctr" defTabSz="1422400">
+          <a:pPr lvl="0" algn="ctr" defTabSz="2133600">
             <a:lnSpc>
               <a:spcPct val="90000"/>
             </a:lnSpc>
@@ -1208,15 +1233,23 @@
             </a:spcAft>
           </a:pPr>
           <a:r>
-            <a:rPr lang="nl-NL" sz="3200" kern="1200" dirty="0" smtClean="0"/>
+            <a:rPr lang="nl-NL" sz="4800" kern="1200" dirty="0" smtClean="0">
+              <a:latin typeface="Avenir Next" charset="0"/>
+              <a:ea typeface="Avenir Next" charset="0"/>
+              <a:cs typeface="Avenir Next" charset="0"/>
+            </a:rPr>
             <a:t>N</a:t>
           </a:r>
-          <a:endParaRPr lang="nl-NL" sz="3200" kern="1200" dirty="0"/>
+          <a:endParaRPr lang="nl-NL" sz="4800" kern="1200" dirty="0">
+            <a:latin typeface="Avenir Next" charset="0"/>
+            <a:ea typeface="Avenir Next" charset="0"/>
+            <a:cs typeface="Avenir Next" charset="0"/>
+          </a:endParaRPr>
         </a:p>
       </dsp:txBody>
       <dsp:txXfrm>
-        <a:off x="6562351" y="3443355"/>
-        <a:ext cx="630330" cy="625664"/>
+        <a:off x="6562351" y="3189170"/>
+        <a:ext cx="630330" cy="1134034"/>
       </dsp:txXfrm>
     </dsp:sp>
     <dsp:sp modelId="{98A474B5-D0EE-844D-BB78-CBBE9280E876}">
@@ -1226,45 +1259,21 @@
       </dsp:nvSpPr>
       <dsp:spPr>
         <a:xfrm>
-          <a:off x="1433623" y="722323"/>
+          <a:off x="1451062" y="654595"/>
           <a:ext cx="6067727" cy="6067727"/>
         </a:xfrm>
         <a:prstGeom prst="circularArrow">
           <a:avLst>
             <a:gd name="adj1" fmla="val 9490"/>
             <a:gd name="adj2" fmla="val 685642"/>
-            <a:gd name="adj3" fmla="val 9751571"/>
-            <a:gd name="adj4" fmla="val 447497"/>
+            <a:gd name="adj3" fmla="val 9198106"/>
+            <a:gd name="adj4" fmla="val 916230"/>
             <a:gd name="adj5" fmla="val 11072"/>
           </a:avLst>
         </a:prstGeom>
-        <a:gradFill rotWithShape="0">
-          <a:gsLst>
-            <a:gs pos="0">
-              <a:schemeClr val="accent1">
-                <a:hueOff val="0"/>
-                <a:satOff val="0"/>
-                <a:lumOff val="0"/>
-                <a:alphaOff val="0"/>
-                <a:tint val="100000"/>
-                <a:shade val="100000"/>
-                <a:satMod val="130000"/>
-              </a:schemeClr>
-            </a:gs>
-            <a:gs pos="100000">
-              <a:schemeClr val="accent1">
-                <a:hueOff val="0"/>
-                <a:satOff val="0"/>
-                <a:lumOff val="0"/>
-                <a:alphaOff val="0"/>
-                <a:tint val="50000"/>
-                <a:shade val="100000"/>
-                <a:satMod val="350000"/>
-              </a:schemeClr>
-            </a:gs>
-          </a:gsLst>
-          <a:lin ang="16200000" scaled="0"/>
-        </a:gradFill>
+        <a:solidFill>
+          <a:srgbClr val="256BA1"/>
+        </a:solidFill>
         <a:ln>
           <a:noFill/>
         </a:ln>
@@ -1298,8 +1307,8 @@
       </dsp:nvSpPr>
       <dsp:spPr>
         <a:xfrm>
-          <a:off x="1647114" y="3502327"/>
-          <a:ext cx="820685" cy="507719"/>
+          <a:off x="1680999" y="3189155"/>
+          <a:ext cx="820685" cy="1134063"/>
         </a:xfrm>
         <a:prstGeom prst="rect">
           <a:avLst/>
@@ -1323,12 +1332,12 @@
         <a:fontRef idx="minor"/>
       </dsp:style>
       <dsp:txBody>
-        <a:bodyPr spcFirstLastPara="0" vert="horz" wrap="square" lIns="40640" tIns="40640" rIns="40640" bIns="40640" numCol="1" spcCol="1270" anchor="ctr" anchorCtr="0">
+        <a:bodyPr spcFirstLastPara="0" vert="horz" wrap="square" lIns="60960" tIns="60960" rIns="60960" bIns="60960" numCol="1" spcCol="1270" anchor="ctr" anchorCtr="0">
           <a:noAutofit/>
         </a:bodyPr>
         <a:lstStyle/>
         <a:p>
-          <a:pPr lvl="0" algn="ctr" defTabSz="1422400">
+          <a:pPr lvl="0" algn="ctr" defTabSz="2133600">
             <a:lnSpc>
               <a:spcPct val="90000"/>
             </a:lnSpc>
@@ -1340,15 +1349,23 @@
             </a:spcAft>
           </a:pPr>
           <a:r>
-            <a:rPr lang="nl-NL" sz="3200" kern="1200" dirty="0" smtClean="0"/>
+            <a:rPr lang="nl-NL" sz="4800" kern="1200" dirty="0" smtClean="0">
+              <a:latin typeface="Avenir Next" charset="0"/>
+              <a:ea typeface="Avenir Next" charset="0"/>
+              <a:cs typeface="Avenir Next" charset="0"/>
+            </a:rPr>
             <a:t>R</a:t>
           </a:r>
-          <a:endParaRPr lang="nl-NL" sz="3200" kern="1200" dirty="0"/>
+          <a:endParaRPr lang="nl-NL" sz="4800" kern="1200" dirty="0">
+            <a:latin typeface="Avenir Next" charset="0"/>
+            <a:ea typeface="Avenir Next" charset="0"/>
+            <a:cs typeface="Avenir Next" charset="0"/>
+          </a:endParaRPr>
         </a:p>
       </dsp:txBody>
       <dsp:txXfrm>
-        <a:off x="1647114" y="3502327"/>
-        <a:ext cx="820685" cy="507719"/>
+        <a:off x="1680999" y="3189155"/>
+        <a:ext cx="820685" cy="1134063"/>
       </dsp:txXfrm>
     </dsp:sp>
     <dsp:sp modelId="{82A1DAD5-D719-C24A-A140-7F7493E5FA5C}">
@@ -1358,45 +1375,21 @@
       </dsp:nvSpPr>
       <dsp:spPr>
         <a:xfrm>
-          <a:off x="1433623" y="722414"/>
+          <a:off x="1451062" y="790142"/>
           <a:ext cx="6067727" cy="6067545"/>
         </a:xfrm>
         <a:prstGeom prst="circularArrow">
           <a:avLst>
             <a:gd name="adj1" fmla="val 9490"/>
             <a:gd name="adj2" fmla="val 685642"/>
-            <a:gd name="adj3" fmla="val 20466861"/>
-            <a:gd name="adj4" fmla="val 11162787"/>
+            <a:gd name="adj3" fmla="val 19998128"/>
+            <a:gd name="adj4" fmla="val 11716252"/>
             <a:gd name="adj5" fmla="val 11072"/>
           </a:avLst>
         </a:prstGeom>
-        <a:gradFill rotWithShape="0">
-          <a:gsLst>
-            <a:gs pos="0">
-              <a:schemeClr val="accent1">
-                <a:hueOff val="0"/>
-                <a:satOff val="0"/>
-                <a:lumOff val="0"/>
-                <a:alphaOff val="0"/>
-                <a:tint val="100000"/>
-                <a:shade val="100000"/>
-                <a:satMod val="130000"/>
-              </a:schemeClr>
-            </a:gs>
-            <a:gs pos="100000">
-              <a:schemeClr val="accent1">
-                <a:hueOff val="0"/>
-                <a:satOff val="0"/>
-                <a:lumOff val="0"/>
-                <a:alphaOff val="0"/>
-                <a:tint val="50000"/>
-                <a:shade val="100000"/>
-                <a:satMod val="350000"/>
-              </a:schemeClr>
-            </a:gs>
-          </a:gsLst>
-          <a:lin ang="16200000" scaled="0"/>
-        </a:gradFill>
+        <a:solidFill>
+          <a:srgbClr val="256BA1"/>
+        </a:solidFill>
         <a:ln>
           <a:noFill/>
         </a:ln>
@@ -7223,7 +7216,7 @@
         </p:nvSpPr>
         <p:spPr bwMode="auto">
           <a:xfrm>
-            <a:off x="15768637" y="4611008"/>
+            <a:off x="33288754" y="4926851"/>
             <a:ext cx="13425488" cy="9857317"/>
           </a:xfrm>
           <a:prstGeom prst="rect">
@@ -7557,8 +7550,8 @@
         </p:nvSpPr>
         <p:spPr bwMode="auto">
           <a:xfrm>
-            <a:off x="15894050" y="38239701"/>
-            <a:ext cx="13174663" cy="3651976"/>
+            <a:off x="15719627" y="38239701"/>
+            <a:ext cx="13506247" cy="3651976"/>
           </a:xfrm>
           <a:prstGeom prst="rect">
             <a:avLst/>
@@ -8442,8 +8435,8 @@
         </p:nvSpPr>
         <p:spPr bwMode="auto">
           <a:xfrm>
-            <a:off x="1270000" y="38239700"/>
-            <a:ext cx="13495541" cy="3657600"/>
+            <a:off x="965200" y="38239700"/>
+            <a:ext cx="13474700" cy="3657600"/>
           </a:xfrm>
           <a:prstGeom prst="rect">
             <a:avLst/>
@@ -8734,7 +8727,7 @@
         </p:nvSpPr>
         <p:spPr bwMode="auto">
           <a:xfrm>
-            <a:off x="15894050" y="26725174"/>
+            <a:off x="38959623" y="28394288"/>
             <a:ext cx="13174663" cy="10078068"/>
           </a:xfrm>
           <a:prstGeom prst="rect">
@@ -8977,7 +8970,7 @@
           <a:p>
             <a:pPr algn="ctr" eaLnBrk="1" hangingPunct="1"/>
             <a:r>
-              <a:rPr lang="nl-NL" altLang="nl-NL" sz="8600" dirty="0" err="1" smtClean="0">
+              <a:rPr lang="nl-NL" altLang="nl-NL" sz="8600" b="1" dirty="0" err="1" smtClean="0">
                 <a:latin typeface="Avenir Next" charset="0"/>
                 <a:ea typeface="Avenir Next" charset="0"/>
                 <a:cs typeface="Avenir Next" charset="0"/>
@@ -8985,7 +8978,7 @@
               <a:t>Optimal</a:t>
             </a:r>
             <a:r>
-              <a:rPr lang="nl-NL" altLang="nl-NL" sz="8600" dirty="0" smtClean="0">
+              <a:rPr lang="nl-NL" altLang="nl-NL" sz="8600" b="1" dirty="0" smtClean="0">
                 <a:latin typeface="Avenir Next" charset="0"/>
                 <a:ea typeface="Avenir Next" charset="0"/>
                 <a:cs typeface="Avenir Next" charset="0"/>
@@ -8993,7 +8986,7 @@
               <a:t> </a:t>
             </a:r>
             <a:r>
-              <a:rPr lang="nl-NL" altLang="nl-NL" sz="8600" dirty="0" err="1" smtClean="0">
+              <a:rPr lang="nl-NL" altLang="nl-NL" sz="8600" b="1" dirty="0" err="1" smtClean="0">
                 <a:latin typeface="Avenir Next" charset="0"/>
                 <a:ea typeface="Avenir Next" charset="0"/>
                 <a:cs typeface="Avenir Next" charset="0"/>
@@ -9001,7 +8994,7 @@
               <a:t>Size</a:t>
             </a:r>
             <a:r>
-              <a:rPr lang="nl-NL" altLang="nl-NL" sz="8600" dirty="0" smtClean="0">
+              <a:rPr lang="nl-NL" altLang="nl-NL" sz="8600" b="1" dirty="0" smtClean="0">
                 <a:latin typeface="Avenir Next" charset="0"/>
                 <a:ea typeface="Avenir Next" charset="0"/>
                 <a:cs typeface="Avenir Next" charset="0"/>
@@ -9009,7 +9002,7 @@
               <a:t> </a:t>
             </a:r>
             <a:r>
-              <a:rPr lang="nl-NL" altLang="nl-NL" sz="8600" dirty="0" err="1" smtClean="0">
+              <a:rPr lang="nl-NL" altLang="nl-NL" sz="8600" b="1" dirty="0" err="1" smtClean="0">
                 <a:latin typeface="Avenir Next" charset="0"/>
                 <a:ea typeface="Avenir Next" charset="0"/>
                 <a:cs typeface="Avenir Next" charset="0"/>
@@ -9017,14 +9010,14 @@
               <a:t>Sorting</a:t>
             </a:r>
             <a:r>
-              <a:rPr lang="nl-NL" altLang="nl-NL" sz="8600" dirty="0" smtClean="0">
+              <a:rPr lang="nl-NL" altLang="nl-NL" sz="8600" b="1" dirty="0" smtClean="0">
                 <a:latin typeface="Avenir Next" charset="0"/>
                 <a:ea typeface="Avenir Next" charset="0"/>
                 <a:cs typeface="Avenir Next" charset="0"/>
               </a:rPr>
               <a:t> Network</a:t>
             </a:r>
-            <a:endParaRPr lang="nl-NL" altLang="nl-NL" sz="8600" dirty="0">
+            <a:endParaRPr lang="nl-NL" altLang="nl-NL" sz="8600" b="1" dirty="0">
               <a:latin typeface="Avenir Next" charset="0"/>
               <a:ea typeface="Avenir Next" charset="0"/>
               <a:cs typeface="Avenir Next" charset="0"/>
@@ -9040,7 +9033,7 @@
         </p:nvSpPr>
         <p:spPr>
           <a:xfrm>
-            <a:off x="3917950" y="37377009"/>
+            <a:off x="3765550" y="37377009"/>
             <a:ext cx="317500" cy="288925"/>
           </a:xfrm>
           <a:prstGeom prst="ellipse">
@@ -9093,7 +9086,7 @@
         </p:nvSpPr>
         <p:spPr>
           <a:xfrm>
-            <a:off x="6708775" y="37377009"/>
+            <a:off x="6556375" y="37377009"/>
             <a:ext cx="317500" cy="288925"/>
           </a:xfrm>
           <a:prstGeom prst="ellipse">
@@ -9146,7 +9139,7 @@
         </p:nvSpPr>
         <p:spPr>
           <a:xfrm>
-            <a:off x="9501188" y="37377009"/>
+            <a:off x="9348788" y="37377009"/>
             <a:ext cx="317500" cy="288925"/>
           </a:xfrm>
           <a:prstGeom prst="ellipse">
@@ -9199,7 +9192,7 @@
         </p:nvSpPr>
         <p:spPr>
           <a:xfrm>
-            <a:off x="12293600" y="37377009"/>
+            <a:off x="12141200" y="37377009"/>
             <a:ext cx="317500" cy="288925"/>
           </a:xfrm>
           <a:prstGeom prst="ellipse">
@@ -9252,7 +9245,7 @@
         </p:nvSpPr>
         <p:spPr>
           <a:xfrm>
-            <a:off x="15084425" y="37377009"/>
+            <a:off x="14932025" y="37377009"/>
             <a:ext cx="317500" cy="288925"/>
           </a:xfrm>
           <a:prstGeom prst="ellipse">
@@ -9305,7 +9298,7 @@
         </p:nvSpPr>
         <p:spPr>
           <a:xfrm>
-            <a:off x="17876838" y="37377009"/>
+            <a:off x="17724438" y="37377009"/>
             <a:ext cx="317500" cy="288925"/>
           </a:xfrm>
           <a:prstGeom prst="ellipse">
@@ -9358,7 +9351,7 @@
         </p:nvSpPr>
         <p:spPr>
           <a:xfrm>
-            <a:off x="20667663" y="37377009"/>
+            <a:off x="20515263" y="37377009"/>
             <a:ext cx="317500" cy="288925"/>
           </a:xfrm>
           <a:prstGeom prst="ellipse">
@@ -9411,7 +9404,7 @@
         </p:nvSpPr>
         <p:spPr>
           <a:xfrm>
-            <a:off x="23460075" y="37377009"/>
+            <a:off x="23307675" y="37377009"/>
             <a:ext cx="317500" cy="288925"/>
           </a:xfrm>
           <a:prstGeom prst="ellipse">
@@ -9464,7 +9457,7 @@
         </p:nvSpPr>
         <p:spPr>
           <a:xfrm>
-            <a:off x="26250900" y="37377009"/>
+            <a:off x="26098500" y="37377009"/>
             <a:ext cx="317500" cy="288925"/>
           </a:xfrm>
           <a:prstGeom prst="ellipse">
@@ -9532,7 +9525,7 @@
         </p:blipFill>
         <p:spPr bwMode="auto">
           <a:xfrm>
-            <a:off x="22737048" y="39645510"/>
+            <a:off x="22889448" y="39615030"/>
             <a:ext cx="6350000" cy="2273300"/>
           </a:xfrm>
           <a:prstGeom prst="rect">
@@ -9593,96 +9586,6 @@
           </a:fontRef>
         </p:style>
       </p:cxnSp>
-      <p:pic>
-        <p:nvPicPr>
-          <p:cNvPr id="14" name="Afbeelding 13"/>
-          <p:cNvPicPr>
-            <a:picLocks noChangeAspect="1"/>
-          </p:cNvPicPr>
-          <p:nvPr/>
-        </p:nvPicPr>
-        <p:blipFill>
-          <a:blip r:embed="rId5">
-            <a:extLst>
-              <a:ext uri="{28A0092B-C50C-407E-A947-70E740481C1C}">
-                <a14:useLocalDpi xmlns:a14="http://schemas.microsoft.com/office/drawing/2010/main" val="0"/>
-              </a:ext>
-            </a:extLst>
-          </a:blip>
-          <a:stretch>
-            <a:fillRect/>
-          </a:stretch>
-        </p:blipFill>
-        <p:spPr>
-          <a:xfrm>
-            <a:off x="16665163" y="7321111"/>
-            <a:ext cx="4320000" cy="1936552"/>
-          </a:xfrm>
-          <a:prstGeom prst="rect">
-            <a:avLst/>
-          </a:prstGeom>
-        </p:spPr>
-      </p:pic>
-      <p:pic>
-        <p:nvPicPr>
-          <p:cNvPr id="15" name="Afbeelding 14"/>
-          <p:cNvPicPr>
-            <a:picLocks noChangeAspect="1"/>
-          </p:cNvPicPr>
-          <p:nvPr/>
-        </p:nvPicPr>
-        <p:blipFill>
-          <a:blip r:embed="rId6">
-            <a:extLst>
-              <a:ext uri="{28A0092B-C50C-407E-A947-70E740481C1C}">
-                <a14:useLocalDpi xmlns:a14="http://schemas.microsoft.com/office/drawing/2010/main" val="0"/>
-              </a:ext>
-            </a:extLst>
-          </a:blip>
-          <a:stretch>
-            <a:fillRect/>
-          </a:stretch>
-        </p:blipFill>
-        <p:spPr>
-          <a:xfrm>
-            <a:off x="22737048" y="7421499"/>
-            <a:ext cx="4320000" cy="1936547"/>
-          </a:xfrm>
-          <a:prstGeom prst="rect">
-            <a:avLst/>
-          </a:prstGeom>
-        </p:spPr>
-      </p:pic>
-      <p:pic>
-        <p:nvPicPr>
-          <p:cNvPr id="26" name="Afbeelding 25"/>
-          <p:cNvPicPr>
-            <a:picLocks noChangeAspect="1"/>
-          </p:cNvPicPr>
-          <p:nvPr/>
-        </p:nvPicPr>
-        <p:blipFill>
-          <a:blip r:embed="rId7">
-            <a:extLst>
-              <a:ext uri="{28A0092B-C50C-407E-A947-70E740481C1C}">
-                <a14:useLocalDpi xmlns:a14="http://schemas.microsoft.com/office/drawing/2010/main" val="0"/>
-              </a:ext>
-            </a:extLst>
-          </a:blip>
-          <a:stretch>
-            <a:fillRect/>
-          </a:stretch>
-        </p:blipFill>
-        <p:spPr>
-          <a:xfrm>
-            <a:off x="18288001" y="9734798"/>
-            <a:ext cx="7200000" cy="3443050"/>
-          </a:xfrm>
-          <a:prstGeom prst="rect">
-            <a:avLst/>
-          </a:prstGeom>
-        </p:spPr>
-      </p:pic>
       <p:graphicFrame>
         <p:nvGraphicFramePr>
           <p:cNvPr id="27" name="Diagram 26"/>
@@ -9690,18 +9593,18 @@
           <p:nvPr>
             <p:extLst>
               <p:ext uri="{D42A27DB-BD31-4B8C-83A1-F6EECF244321}">
-                <p14:modId xmlns:p14="http://schemas.microsoft.com/office/powerpoint/2010/main" val="349535917"/>
+                <p14:modId xmlns:p14="http://schemas.microsoft.com/office/powerpoint/2010/main" val="1657200841"/>
               </p:ext>
             </p:extLst>
           </p:nvPr>
         </p:nvGraphicFramePr>
         <p:xfrm>
-          <a:off x="10851130" y="12533702"/>
+          <a:off x="10596363" y="12484618"/>
           <a:ext cx="7773609" cy="7512375"/>
         </p:xfrm>
         <a:graphic>
           <a:graphicData uri="http://schemas.openxmlformats.org/drawingml/2006/diagram">
-            <dgm:relIds xmlns:dgm="http://schemas.openxmlformats.org/drawingml/2006/diagram" xmlns:r="http://schemas.openxmlformats.org/officeDocument/2006/relationships" r:dm="rId8" r:lo="rId9" r:qs="rId10" r:cs="rId11"/>
+            <dgm:relIds xmlns:dgm="http://schemas.openxmlformats.org/drawingml/2006/diagram" xmlns:r="http://schemas.openxmlformats.org/officeDocument/2006/relationships" r:dm="rId5" r:lo="rId6" r:qs="rId7" r:cs="rId8"/>
           </a:graphicData>
         </a:graphic>
       </p:graphicFrame>
@@ -9713,7 +9616,7 @@
         </p:nvSpPr>
         <p:spPr>
           <a:xfrm>
-            <a:off x="20883261" y="17329885"/>
+            <a:off x="35448754" y="16064122"/>
             <a:ext cx="3507694" cy="1015663"/>
           </a:xfrm>
           <a:prstGeom prst="rect">
@@ -9751,7 +9654,7 @@
         </p:nvSpPr>
         <p:spPr>
           <a:xfrm>
-            <a:off x="21475851" y="23194945"/>
+            <a:off x="38956448" y="17767364"/>
             <a:ext cx="2322513" cy="1015663"/>
           </a:xfrm>
           <a:prstGeom prst="rect">
@@ -9789,7 +9692,7 @@
         </p:nvSpPr>
         <p:spPr>
           <a:xfrm rot="5400000">
-            <a:off x="2762847" y="3118160"/>
+            <a:off x="2458047" y="3118160"/>
             <a:ext cx="10489005" cy="13474701"/>
           </a:xfrm>
           <a:prstGeom prst="snip1Rect">
@@ -9821,7 +9724,7 @@
           </a:fontRef>
         </p:style>
         <p:txBody>
-          <a:bodyPr vert="vert270" lIns="540000" tIns="0" bIns="720000" rtlCol="0" anchor="t"/>
+          <a:bodyPr vert="vert270" lIns="1080000" tIns="0" rIns="180000" bIns="720000" rtlCol="0" anchor="t"/>
           <a:lstStyle/>
           <a:p>
             <a:pPr algn="just" eaLnBrk="1" hangingPunct="1">
@@ -10005,7 +9908,7 @@
         </p:nvSpPr>
         <p:spPr>
           <a:xfrm>
-            <a:off x="1280419" y="17329885"/>
+            <a:off x="975619" y="17329885"/>
             <a:ext cx="13474701" cy="19473357"/>
           </a:xfrm>
           <a:prstGeom prst="snip1Rect">
@@ -10202,7 +10105,7 @@
               <a:t>comparatoren</a:t>
             </a:r>
             <a:r>
-              <a:rPr lang="nl-NL" altLang="nl-NL" sz="3600" dirty="0">
+              <a:rPr lang="nl-NL" altLang="nl-NL" sz="3600" dirty="0" smtClean="0">
                 <a:solidFill>
                   <a:srgbClr val="191919"/>
                 </a:solidFill>
@@ -10212,6 +10115,91 @@
               </a:rPr>
               <a:t>.</a:t>
             </a:r>
+          </a:p>
+          <a:p>
+            <a:pPr marL="571500" indent="-571500" algn="just" eaLnBrk="1" hangingPunct="1">
+              <a:spcBef>
+                <a:spcPct val="10000"/>
+              </a:spcBef>
+              <a:buFont typeface="Arial" charset="0"/>
+              <a:buChar char="•"/>
+            </a:pPr>
+            <a:endParaRPr lang="nl-NL" altLang="nl-NL" sz="3600" dirty="0">
+              <a:solidFill>
+                <a:srgbClr val="191919"/>
+              </a:solidFill>
+              <a:latin typeface="Avenir Next" charset="0"/>
+              <a:ea typeface="Avenir Next" charset="0"/>
+              <a:cs typeface="Avenir Next" charset="0"/>
+            </a:endParaRPr>
+          </a:p>
+          <a:p>
+            <a:pPr marL="571500" indent="-571500" algn="just" eaLnBrk="1" hangingPunct="1">
+              <a:spcBef>
+                <a:spcPct val="10000"/>
+              </a:spcBef>
+              <a:buFont typeface="Arial" charset="0"/>
+              <a:buChar char="•"/>
+            </a:pPr>
+            <a:endParaRPr lang="nl-NL" altLang="nl-NL" sz="3600" dirty="0" smtClean="0">
+              <a:solidFill>
+                <a:srgbClr val="191919"/>
+              </a:solidFill>
+              <a:latin typeface="Avenir Next" charset="0"/>
+              <a:ea typeface="Avenir Next" charset="0"/>
+              <a:cs typeface="Avenir Next" charset="0"/>
+            </a:endParaRPr>
+          </a:p>
+          <a:p>
+            <a:pPr marL="571500" indent="-571500" algn="just" eaLnBrk="1" hangingPunct="1">
+              <a:spcBef>
+                <a:spcPct val="10000"/>
+              </a:spcBef>
+              <a:buFont typeface="Arial" charset="0"/>
+              <a:buChar char="•"/>
+            </a:pPr>
+            <a:endParaRPr lang="nl-NL" altLang="nl-NL" sz="3600" dirty="0">
+              <a:solidFill>
+                <a:srgbClr val="191919"/>
+              </a:solidFill>
+              <a:latin typeface="Avenir Next" charset="0"/>
+              <a:ea typeface="Avenir Next" charset="0"/>
+              <a:cs typeface="Avenir Next" charset="0"/>
+            </a:endParaRPr>
+          </a:p>
+          <a:p>
+            <a:pPr marL="571500" indent="-571500" algn="just" eaLnBrk="1" hangingPunct="1">
+              <a:spcBef>
+                <a:spcPct val="10000"/>
+              </a:spcBef>
+              <a:buFont typeface="Arial" charset="0"/>
+              <a:buChar char="•"/>
+            </a:pPr>
+            <a:endParaRPr lang="nl-NL" altLang="nl-NL" sz="3600" dirty="0" smtClean="0">
+              <a:solidFill>
+                <a:srgbClr val="191919"/>
+              </a:solidFill>
+              <a:latin typeface="Avenir Next" charset="0"/>
+              <a:ea typeface="Avenir Next" charset="0"/>
+              <a:cs typeface="Avenir Next" charset="0"/>
+            </a:endParaRPr>
+          </a:p>
+          <a:p>
+            <a:pPr marL="571500" indent="-571500" algn="just" eaLnBrk="1" hangingPunct="1">
+              <a:spcBef>
+                <a:spcPct val="10000"/>
+              </a:spcBef>
+              <a:buFont typeface="Arial" charset="0"/>
+              <a:buChar char="•"/>
+            </a:pPr>
+            <a:endParaRPr lang="nl-NL" altLang="nl-NL" sz="3600" dirty="0">
+              <a:solidFill>
+                <a:srgbClr val="191919"/>
+              </a:solidFill>
+              <a:latin typeface="Avenir Next" charset="0"/>
+              <a:ea typeface="Avenir Next" charset="0"/>
+              <a:cs typeface="Avenir Next" charset="0"/>
+            </a:endParaRPr>
           </a:p>
           <a:p>
             <a:pPr algn="just" eaLnBrk="1" hangingPunct="1">
@@ -10400,8 +10388,115 @@
                 <a:ea typeface="Avenir Next" charset="0"/>
                 <a:cs typeface="Avenir Next" charset="0"/>
               </a:rPr>
-              <a:t> manipuleert de data die binnenkomt via die twee kanalen door de input van de twee kanalen te vergelijken en de kleinste waarde in het bovenste kanaal te plaatsen en de hoogste waarde in het onderste kanaal.</a:t>
-            </a:r>
+              <a:t> manipuleert de data die binnenkomt via die twee kanalen door de input van de twee kanalen te vergelijken en de kleinste waarde in het bovenste kanaal te plaatsen en de hoogste waarde in het onderste kanaal</a:t>
+            </a:r>
+            <a:r>
+              <a:rPr lang="nl-NL" altLang="nl-NL" sz="3600" dirty="0" smtClean="0">
+                <a:solidFill>
+                  <a:srgbClr val="191919"/>
+                </a:solidFill>
+                <a:latin typeface="Avenir Next" charset="0"/>
+                <a:ea typeface="Avenir Next" charset="0"/>
+                <a:cs typeface="Avenir Next" charset="0"/>
+              </a:rPr>
+              <a:t>.</a:t>
+            </a:r>
+          </a:p>
+          <a:p>
+            <a:pPr algn="just" eaLnBrk="1" hangingPunct="1">
+              <a:spcBef>
+                <a:spcPct val="10000"/>
+              </a:spcBef>
+              <a:buNone/>
+            </a:pPr>
+            <a:endParaRPr lang="nl-NL" altLang="nl-NL" sz="3600" dirty="0">
+              <a:solidFill>
+                <a:srgbClr val="191919"/>
+              </a:solidFill>
+              <a:latin typeface="Avenir Next" charset="0"/>
+              <a:ea typeface="Avenir Next" charset="0"/>
+              <a:cs typeface="Avenir Next" charset="0"/>
+            </a:endParaRPr>
+          </a:p>
+          <a:p>
+            <a:pPr algn="just" eaLnBrk="1" hangingPunct="1">
+              <a:spcBef>
+                <a:spcPct val="10000"/>
+              </a:spcBef>
+              <a:buNone/>
+            </a:pPr>
+            <a:endParaRPr lang="nl-NL" altLang="nl-NL" sz="3600" dirty="0" smtClean="0">
+              <a:solidFill>
+                <a:srgbClr val="191919"/>
+              </a:solidFill>
+              <a:latin typeface="Avenir Next" charset="0"/>
+              <a:ea typeface="Avenir Next" charset="0"/>
+              <a:cs typeface="Avenir Next" charset="0"/>
+            </a:endParaRPr>
+          </a:p>
+          <a:p>
+            <a:pPr algn="just" eaLnBrk="1" hangingPunct="1">
+              <a:spcBef>
+                <a:spcPct val="10000"/>
+              </a:spcBef>
+              <a:buNone/>
+            </a:pPr>
+            <a:endParaRPr lang="nl-NL" altLang="nl-NL" sz="3600" dirty="0">
+              <a:solidFill>
+                <a:srgbClr val="191919"/>
+              </a:solidFill>
+              <a:latin typeface="Avenir Next" charset="0"/>
+              <a:ea typeface="Avenir Next" charset="0"/>
+              <a:cs typeface="Avenir Next" charset="0"/>
+            </a:endParaRPr>
+          </a:p>
+          <a:p>
+            <a:pPr algn="just" eaLnBrk="1" hangingPunct="1">
+              <a:spcBef>
+                <a:spcPct val="10000"/>
+              </a:spcBef>
+              <a:buNone/>
+            </a:pPr>
+            <a:endParaRPr lang="nl-NL" altLang="nl-NL" sz="3600" dirty="0" smtClean="0">
+              <a:solidFill>
+                <a:srgbClr val="191919"/>
+              </a:solidFill>
+              <a:latin typeface="Avenir Next" charset="0"/>
+              <a:ea typeface="Avenir Next" charset="0"/>
+              <a:cs typeface="Avenir Next" charset="0"/>
+            </a:endParaRPr>
+          </a:p>
+          <a:p>
+            <a:pPr algn="just" eaLnBrk="1" hangingPunct="1">
+              <a:spcBef>
+                <a:spcPct val="10000"/>
+              </a:spcBef>
+              <a:buNone/>
+            </a:pPr>
+            <a:endParaRPr lang="nl-NL" altLang="nl-NL" sz="3600" dirty="0">
+              <a:solidFill>
+                <a:srgbClr val="191919"/>
+              </a:solidFill>
+              <a:latin typeface="Avenir Next" charset="0"/>
+              <a:ea typeface="Avenir Next" charset="0"/>
+              <a:cs typeface="Avenir Next" charset="0"/>
+            </a:endParaRPr>
+          </a:p>
+          <a:p>
+            <a:pPr algn="just" eaLnBrk="1" hangingPunct="1">
+              <a:spcBef>
+                <a:spcPct val="10000"/>
+              </a:spcBef>
+              <a:buNone/>
+            </a:pPr>
+            <a:endParaRPr lang="nl-NL" altLang="nl-NL" sz="3600" dirty="0">
+              <a:solidFill>
+                <a:srgbClr val="191919"/>
+              </a:solidFill>
+              <a:latin typeface="Avenir Next" charset="0"/>
+              <a:ea typeface="Avenir Next" charset="0"/>
+              <a:cs typeface="Avenir Next" charset="0"/>
+            </a:endParaRPr>
           </a:p>
           <a:p>
             <a:pPr algn="just" eaLnBrk="1" hangingPunct="1">
@@ -10419,6 +10514,50 @@
               <a:cs typeface="Avenir Next" charset="0"/>
             </a:endParaRPr>
           </a:p>
+        </p:txBody>
+      </p:sp>
+      <p:sp>
+        <p:nvSpPr>
+          <p:cNvPr id="30" name="Afgeschuind enkele hoek rechthoek 29"/>
+          <p:cNvSpPr/>
+          <p:nvPr/>
+        </p:nvSpPr>
+        <p:spPr>
+          <a:xfrm rot="16200000" flipH="1">
+            <a:off x="17244256" y="3118160"/>
+            <a:ext cx="10489006" cy="13474701"/>
+          </a:xfrm>
+          <a:prstGeom prst="snip1Rect">
+            <a:avLst>
+              <a:gd name="adj" fmla="val 25385"/>
+            </a:avLst>
+          </a:prstGeom>
+          <a:solidFill>
+            <a:schemeClr val="bg1"/>
+          </a:solidFill>
+          <a:ln>
+            <a:solidFill>
+              <a:schemeClr val="tx1"/>
+            </a:solidFill>
+          </a:ln>
+        </p:spPr>
+        <p:style>
+          <a:lnRef idx="1">
+            <a:schemeClr val="accent1"/>
+          </a:lnRef>
+          <a:fillRef idx="3">
+            <a:schemeClr val="accent1"/>
+          </a:fillRef>
+          <a:effectRef idx="2">
+            <a:schemeClr val="accent1"/>
+          </a:effectRef>
+          <a:fontRef idx="minor">
+            <a:schemeClr val="lt1"/>
+          </a:fontRef>
+        </p:style>
+        <p:txBody>
+          <a:bodyPr vert="vert" lIns="180000" tIns="0" rIns="1080000" bIns="720000" rtlCol="0" anchor="t"/>
+          <a:lstStyle/>
           <a:p>
             <a:pPr algn="just" eaLnBrk="1" hangingPunct="1">
               <a:spcBef>
@@ -10498,7 +10637,7 @@
               <a:t>comparatoren</a:t>
             </a:r>
             <a:r>
-              <a:rPr lang="nl-NL" altLang="nl-NL" sz="3600" dirty="0" smtClean="0">
+              <a:rPr lang="nl-NL" altLang="nl-NL" sz="3600" dirty="0">
                 <a:solidFill>
                   <a:srgbClr val="191919"/>
                 </a:solidFill>
@@ -10508,6 +10647,467 @@
               </a:rPr>
               <a:t>.</a:t>
             </a:r>
+          </a:p>
+        </p:txBody>
+      </p:sp>
+      <p:sp>
+        <p:nvSpPr>
+          <p:cNvPr id="31" name="Afgeschuind enkele hoek rechthoek 30"/>
+          <p:cNvSpPr/>
+          <p:nvPr/>
+        </p:nvSpPr>
+        <p:spPr>
+          <a:xfrm flipH="1">
+            <a:off x="15719627" y="17329885"/>
+            <a:ext cx="13474701" cy="19473357"/>
+          </a:xfrm>
+          <a:prstGeom prst="snip1Rect">
+            <a:avLst>
+              <a:gd name="adj" fmla="val 19636"/>
+            </a:avLst>
+          </a:prstGeom>
+          <a:solidFill>
+            <a:schemeClr val="bg1"/>
+          </a:solidFill>
+          <a:ln>
+            <a:solidFill>
+              <a:srgbClr val="191919"/>
+            </a:solidFill>
+          </a:ln>
+        </p:spPr>
+        <p:style>
+          <a:lnRef idx="1">
+            <a:schemeClr val="accent1"/>
+          </a:lnRef>
+          <a:fillRef idx="3">
+            <a:schemeClr val="accent1"/>
+          </a:fillRef>
+          <a:effectRef idx="2">
+            <a:schemeClr val="accent1"/>
+          </a:effectRef>
+          <a:fontRef idx="minor">
+            <a:schemeClr val="lt1"/>
+          </a:fontRef>
+        </p:style>
+        <p:txBody>
+          <a:bodyPr lIns="720000" tIns="0" rIns="0" bIns="0" rtlCol="0" anchor="t"/>
+          <a:lstStyle/>
+          <a:p>
+            <a:pPr algn="just" eaLnBrk="1" hangingPunct="1">
+              <a:spcBef>
+                <a:spcPct val="50000"/>
+              </a:spcBef>
+              <a:buFontTx/>
+              <a:buNone/>
+            </a:pPr>
+            <a:r>
+              <a:rPr lang="nl-NL" altLang="nl-NL" sz="4800" b="1" dirty="0" smtClean="0">
+                <a:solidFill>
+                  <a:srgbClr val="191919"/>
+                </a:solidFill>
+                <a:latin typeface="Avenir Next" charset="0"/>
+                <a:ea typeface="Avenir Next" charset="0"/>
+                <a:cs typeface="Avenir Next" charset="0"/>
+              </a:rPr>
+              <a:t>Resultaten</a:t>
+            </a:r>
+            <a:endParaRPr lang="nl-NL" altLang="nl-NL" sz="3600" b="1" dirty="0" smtClean="0">
+              <a:solidFill>
+                <a:srgbClr val="191919"/>
+              </a:solidFill>
+              <a:latin typeface="Avenir Next" charset="0"/>
+              <a:ea typeface="Avenir Next" charset="0"/>
+              <a:cs typeface="Avenir Next" charset="0"/>
+            </a:endParaRPr>
+          </a:p>
+          <a:p>
+            <a:pPr algn="just" eaLnBrk="1" hangingPunct="1">
+              <a:spcBef>
+                <a:spcPct val="50000"/>
+              </a:spcBef>
+              <a:buFontTx/>
+              <a:buNone/>
+            </a:pPr>
+            <a:endParaRPr lang="nl-NL" altLang="nl-NL" sz="3600" dirty="0">
+              <a:solidFill>
+                <a:srgbClr val="191919"/>
+              </a:solidFill>
+              <a:latin typeface="Avenir Next" charset="0"/>
+              <a:ea typeface="Avenir Next" charset="0"/>
+              <a:cs typeface="Avenir Next" charset="0"/>
+            </a:endParaRPr>
+          </a:p>
+          <a:p>
+            <a:pPr algn="just" eaLnBrk="1" hangingPunct="1">
+              <a:spcBef>
+                <a:spcPct val="50000"/>
+              </a:spcBef>
+              <a:buFontTx/>
+              <a:buNone/>
+            </a:pPr>
+            <a:endParaRPr lang="nl-NL" altLang="nl-NL" sz="3600" dirty="0" smtClean="0">
+              <a:solidFill>
+                <a:srgbClr val="191919"/>
+              </a:solidFill>
+              <a:latin typeface="Avenir Next" charset="0"/>
+              <a:ea typeface="Avenir Next" charset="0"/>
+              <a:cs typeface="Avenir Next" charset="0"/>
+            </a:endParaRPr>
+          </a:p>
+          <a:p>
+            <a:pPr algn="just" eaLnBrk="1" hangingPunct="1">
+              <a:spcBef>
+                <a:spcPct val="50000"/>
+              </a:spcBef>
+              <a:buFontTx/>
+              <a:buNone/>
+            </a:pPr>
+            <a:endParaRPr lang="nl-NL" altLang="nl-NL" sz="3600" dirty="0">
+              <a:solidFill>
+                <a:srgbClr val="191919"/>
+              </a:solidFill>
+              <a:latin typeface="Avenir Next" charset="0"/>
+              <a:ea typeface="Avenir Next" charset="0"/>
+              <a:cs typeface="Avenir Next" charset="0"/>
+            </a:endParaRPr>
+          </a:p>
+          <a:p>
+            <a:pPr algn="just" eaLnBrk="1" hangingPunct="1">
+              <a:spcBef>
+                <a:spcPct val="50000"/>
+              </a:spcBef>
+              <a:buFontTx/>
+              <a:buNone/>
+            </a:pPr>
+            <a:endParaRPr lang="nl-NL" altLang="nl-NL" sz="3600" dirty="0" smtClean="0">
+              <a:solidFill>
+                <a:srgbClr val="191919"/>
+              </a:solidFill>
+              <a:latin typeface="Avenir Next" charset="0"/>
+              <a:ea typeface="Avenir Next" charset="0"/>
+              <a:cs typeface="Avenir Next" charset="0"/>
+            </a:endParaRPr>
+          </a:p>
+          <a:p>
+            <a:pPr algn="just" eaLnBrk="1" hangingPunct="1">
+              <a:spcBef>
+                <a:spcPct val="50000"/>
+              </a:spcBef>
+              <a:buFontTx/>
+              <a:buNone/>
+            </a:pPr>
+            <a:endParaRPr lang="nl-NL" altLang="nl-NL" sz="3600" dirty="0">
+              <a:solidFill>
+                <a:srgbClr val="191919"/>
+              </a:solidFill>
+              <a:latin typeface="Avenir Next" charset="0"/>
+              <a:ea typeface="Avenir Next" charset="0"/>
+              <a:cs typeface="Avenir Next" charset="0"/>
+            </a:endParaRPr>
+          </a:p>
+          <a:p>
+            <a:pPr algn="just" eaLnBrk="1" hangingPunct="1">
+              <a:spcBef>
+                <a:spcPct val="50000"/>
+              </a:spcBef>
+              <a:buFontTx/>
+              <a:buNone/>
+            </a:pPr>
+            <a:endParaRPr lang="nl-NL" altLang="nl-NL" sz="3600" dirty="0" smtClean="0">
+              <a:solidFill>
+                <a:srgbClr val="191919"/>
+              </a:solidFill>
+              <a:latin typeface="Avenir Next" charset="0"/>
+              <a:ea typeface="Avenir Next" charset="0"/>
+              <a:cs typeface="Avenir Next" charset="0"/>
+            </a:endParaRPr>
+          </a:p>
+          <a:p>
+            <a:pPr algn="just" eaLnBrk="1" hangingPunct="1">
+              <a:spcBef>
+                <a:spcPct val="50000"/>
+              </a:spcBef>
+              <a:buFontTx/>
+              <a:buNone/>
+            </a:pPr>
+            <a:endParaRPr lang="nl-NL" altLang="nl-NL" sz="3600" dirty="0">
+              <a:solidFill>
+                <a:srgbClr val="191919"/>
+              </a:solidFill>
+              <a:latin typeface="Avenir Next" charset="0"/>
+              <a:ea typeface="Avenir Next" charset="0"/>
+              <a:cs typeface="Avenir Next" charset="0"/>
+            </a:endParaRPr>
+          </a:p>
+          <a:p>
+            <a:pPr algn="just" eaLnBrk="1" hangingPunct="1">
+              <a:spcBef>
+                <a:spcPct val="50000"/>
+              </a:spcBef>
+              <a:buFontTx/>
+              <a:buNone/>
+            </a:pPr>
+            <a:endParaRPr lang="nl-NL" altLang="nl-NL" sz="3600" dirty="0" smtClean="0">
+              <a:solidFill>
+                <a:srgbClr val="191919"/>
+              </a:solidFill>
+              <a:latin typeface="Avenir Next" charset="0"/>
+              <a:ea typeface="Avenir Next" charset="0"/>
+              <a:cs typeface="Avenir Next" charset="0"/>
+            </a:endParaRPr>
+          </a:p>
+          <a:p>
+            <a:pPr algn="just" eaLnBrk="1" hangingPunct="1">
+              <a:spcBef>
+                <a:spcPct val="50000"/>
+              </a:spcBef>
+              <a:buFontTx/>
+              <a:buNone/>
+            </a:pPr>
+            <a:endParaRPr lang="nl-NL" altLang="nl-NL" sz="3600" dirty="0">
+              <a:solidFill>
+                <a:srgbClr val="191919"/>
+              </a:solidFill>
+              <a:latin typeface="Avenir Next" charset="0"/>
+              <a:ea typeface="Avenir Next" charset="0"/>
+              <a:cs typeface="Avenir Next" charset="0"/>
+            </a:endParaRPr>
+          </a:p>
+          <a:p>
+            <a:pPr algn="just" eaLnBrk="1" hangingPunct="1">
+              <a:spcBef>
+                <a:spcPct val="50000"/>
+              </a:spcBef>
+              <a:buFontTx/>
+              <a:buNone/>
+            </a:pPr>
+            <a:r>
+              <a:rPr lang="nl-NL" altLang="nl-NL" sz="4800" b="1" dirty="0" smtClean="0">
+                <a:solidFill>
+                  <a:srgbClr val="191919"/>
+                </a:solidFill>
+                <a:latin typeface="Avenir Next" charset="0"/>
+                <a:ea typeface="Avenir Next" charset="0"/>
+                <a:cs typeface="Avenir Next" charset="0"/>
+              </a:rPr>
+              <a:t>Conclusie</a:t>
+            </a:r>
+            <a:endParaRPr lang="nl-NL" altLang="nl-NL" sz="3600" b="1" dirty="0" smtClean="0">
+              <a:solidFill>
+                <a:srgbClr val="191919"/>
+              </a:solidFill>
+              <a:latin typeface="Avenir Next" charset="0"/>
+              <a:ea typeface="Avenir Next" charset="0"/>
+              <a:cs typeface="Avenir Next" charset="0"/>
+            </a:endParaRPr>
+          </a:p>
+        </p:txBody>
+      </p:sp>
+      <p:sp>
+        <p:nvSpPr>
+          <p:cNvPr id="33" name="Pijl links 32"/>
+          <p:cNvSpPr/>
+          <p:nvPr/>
+        </p:nvSpPr>
+        <p:spPr>
+          <a:xfrm>
+            <a:off x="18527907" y="15113526"/>
+            <a:ext cx="8196063" cy="2229873"/>
+          </a:xfrm>
+          <a:prstGeom prst="rightArrow">
+            <a:avLst/>
+          </a:prstGeom>
+          <a:solidFill>
+            <a:srgbClr val="256BA1"/>
+          </a:solidFill>
+          <a:ln>
+            <a:noFill/>
+          </a:ln>
+        </p:spPr>
+        <p:style>
+          <a:lnRef idx="1">
+            <a:schemeClr val="accent1"/>
+          </a:lnRef>
+          <a:fillRef idx="3">
+            <a:schemeClr val="accent1"/>
+          </a:fillRef>
+          <a:effectRef idx="2">
+            <a:schemeClr val="accent1"/>
+          </a:effectRef>
+          <a:fontRef idx="minor">
+            <a:schemeClr val="lt1"/>
+          </a:fontRef>
+        </p:style>
+        <p:txBody>
+          <a:bodyPr rtlCol="0" anchor="ctr"/>
+          <a:lstStyle/>
+          <a:p>
+            <a:pPr algn="ctr"/>
+            <a:endParaRPr lang="nl-NL"/>
+          </a:p>
+        </p:txBody>
+      </p:sp>
+      <p:pic>
+        <p:nvPicPr>
+          <p:cNvPr id="14" name="Afbeelding 13"/>
+          <p:cNvPicPr>
+            <a:picLocks noChangeAspect="1"/>
+          </p:cNvPicPr>
+          <p:nvPr/>
+        </p:nvPicPr>
+        <p:blipFill>
+          <a:blip r:embed="rId10">
+            <a:extLst>
+              <a:ext uri="{28A0092B-C50C-407E-A947-70E740481C1C}">
+                <a14:useLocalDpi xmlns:a14="http://schemas.microsoft.com/office/drawing/2010/main" val="0"/>
+              </a:ext>
+            </a:extLst>
+          </a:blip>
+          <a:stretch>
+            <a:fillRect/>
+          </a:stretch>
+        </p:blipFill>
+        <p:spPr>
+          <a:xfrm>
+            <a:off x="2388775" y="33906412"/>
+            <a:ext cx="4320000" cy="1936552"/>
+          </a:xfrm>
+          <a:prstGeom prst="rect">
+            <a:avLst/>
+          </a:prstGeom>
+        </p:spPr>
+      </p:pic>
+      <p:pic>
+        <p:nvPicPr>
+          <p:cNvPr id="15" name="Afbeelding 14"/>
+          <p:cNvPicPr>
+            <a:picLocks noChangeAspect="1"/>
+          </p:cNvPicPr>
+          <p:nvPr/>
+        </p:nvPicPr>
+        <p:blipFill>
+          <a:blip r:embed="rId11">
+            <a:extLst>
+              <a:ext uri="{28A0092B-C50C-407E-A947-70E740481C1C}">
+                <a14:useLocalDpi xmlns:a14="http://schemas.microsoft.com/office/drawing/2010/main" val="0"/>
+              </a:ext>
+            </a:extLst>
+          </a:blip>
+          <a:stretch>
+            <a:fillRect/>
+          </a:stretch>
+        </p:blipFill>
+        <p:spPr>
+          <a:xfrm>
+            <a:off x="8121931" y="33906417"/>
+            <a:ext cx="4320000" cy="1936547"/>
+          </a:xfrm>
+          <a:prstGeom prst="rect">
+            <a:avLst/>
+          </a:prstGeom>
+        </p:spPr>
+      </p:pic>
+      <p:pic>
+        <p:nvPicPr>
+          <p:cNvPr id="26" name="Afbeelding 25"/>
+          <p:cNvPicPr>
+            <a:picLocks noChangeAspect="1"/>
+          </p:cNvPicPr>
+          <p:nvPr/>
+        </p:nvPicPr>
+        <p:blipFill>
+          <a:blip r:embed="rId12">
+            <a:extLst>
+              <a:ext uri="{28A0092B-C50C-407E-A947-70E740481C1C}">
+                <a14:useLocalDpi xmlns:a14="http://schemas.microsoft.com/office/drawing/2010/main" val="0"/>
+              </a:ext>
+            </a:extLst>
+          </a:blip>
+          <a:stretch>
+            <a:fillRect/>
+          </a:stretch>
+        </p:blipFill>
+        <p:spPr>
+          <a:xfrm>
+            <a:off x="19050900" y="10867970"/>
+            <a:ext cx="7200000" cy="3443050"/>
+          </a:xfrm>
+          <a:prstGeom prst="rect">
+            <a:avLst/>
+          </a:prstGeom>
+        </p:spPr>
+      </p:pic>
+      <p:pic>
+        <p:nvPicPr>
+          <p:cNvPr id="5" name="Afbeelding 4"/>
+          <p:cNvPicPr>
+            <a:picLocks noChangeAspect="1"/>
+          </p:cNvPicPr>
+          <p:nvPr/>
+        </p:nvPicPr>
+        <p:blipFill>
+          <a:blip r:embed="rId13">
+            <a:extLst>
+              <a:ext uri="{28A0092B-C50C-407E-A947-70E740481C1C}">
+                <a14:useLocalDpi xmlns:a14="http://schemas.microsoft.com/office/drawing/2010/main" val="0"/>
+              </a:ext>
+            </a:extLst>
+          </a:blip>
+          <a:stretch>
+            <a:fillRect/>
+          </a:stretch>
+        </p:blipFill>
+        <p:spPr>
+          <a:xfrm>
+            <a:off x="4339009" y="22302371"/>
+            <a:ext cx="6332765" cy="3450961"/>
+          </a:xfrm>
+          <a:prstGeom prst="rect">
+            <a:avLst/>
+          </a:prstGeom>
+        </p:spPr>
+      </p:pic>
+      <p:sp>
+        <p:nvSpPr>
+          <p:cNvPr id="35" name="Pijl links 34"/>
+          <p:cNvSpPr/>
+          <p:nvPr/>
+        </p:nvSpPr>
+        <p:spPr>
+          <a:xfrm>
+            <a:off x="3712159" y="15121474"/>
+            <a:ext cx="8196063" cy="2229873"/>
+          </a:xfrm>
+          <a:prstGeom prst="rightArrow">
+            <a:avLst/>
+          </a:prstGeom>
+          <a:solidFill>
+            <a:srgbClr val="256BA1"/>
+          </a:solidFill>
+          <a:ln>
+            <a:noFill/>
+          </a:ln>
+        </p:spPr>
+        <p:style>
+          <a:lnRef idx="1">
+            <a:schemeClr val="accent1"/>
+          </a:lnRef>
+          <a:fillRef idx="3">
+            <a:schemeClr val="accent1"/>
+          </a:fillRef>
+          <a:effectRef idx="2">
+            <a:schemeClr val="accent1"/>
+          </a:effectRef>
+          <a:fontRef idx="minor">
+            <a:schemeClr val="lt1"/>
+          </a:fontRef>
+        </p:style>
+        <p:txBody>
+          <a:bodyPr rtlCol="0" anchor="ctr"/>
+          <a:lstStyle/>
+          <a:p>
+            <a:pPr algn="ctr"/>
+            <a:endParaRPr lang="nl-NL"/>
           </a:p>
         </p:txBody>
       </p:sp>

</xml_diff>